<commit_message>
Testes com dado real com grid irregular.
</commit_message>
<xml_diff>
--- a/manuscript/Fig/edit_mag.pptx
+++ b/manuscript/Fig/edit_mag.pptx
@@ -6,6 +6,7 @@
   </p:sldMasterIdLst>
   <p:sldIdLst>
     <p:sldId id="256" r:id="rId2"/>
+    <p:sldId id="257" r:id="rId3"/>
   </p:sldIdLst>
   <p:sldSz cx="9144000" cy="6858000" type="screen4x3"/>
   <p:notesSz cx="6858000" cy="9144000"/>
@@ -302,7 +303,7 @@
           <a:p>
             <a:fld id="{2E700DB3-DBF0-4086-B675-117E7A9610B8}" type="datetimeFigureOut">
               <a:rPr lang="pt-BR" smtClean="0"/>
-              <a:t>11/05/2021</a:t>
+              <a:t>26/08/2021</a:t>
             </a:fld>
             <a:endParaRPr lang="pt-BR"/>
           </a:p>
@@ -465,7 +466,7 @@
           <a:p>
             <a:fld id="{2E700DB3-DBF0-4086-B675-117E7A9610B8}" type="datetimeFigureOut">
               <a:rPr lang="pt-BR" smtClean="0"/>
-              <a:t>11/05/2021</a:t>
+              <a:t>26/08/2021</a:t>
             </a:fld>
             <a:endParaRPr lang="pt-BR"/>
           </a:p>
@@ -638,7 +639,7 @@
           <a:p>
             <a:fld id="{2E700DB3-DBF0-4086-B675-117E7A9610B8}" type="datetimeFigureOut">
               <a:rPr lang="pt-BR" smtClean="0"/>
-              <a:t>11/05/2021</a:t>
+              <a:t>26/08/2021</a:t>
             </a:fld>
             <a:endParaRPr lang="pt-BR"/>
           </a:p>
@@ -801,7 +802,7 @@
           <a:p>
             <a:fld id="{2E700DB3-DBF0-4086-B675-117E7A9610B8}" type="datetimeFigureOut">
               <a:rPr lang="pt-BR" smtClean="0"/>
-              <a:t>11/05/2021</a:t>
+              <a:t>26/08/2021</a:t>
             </a:fld>
             <a:endParaRPr lang="pt-BR"/>
           </a:p>
@@ -1041,7 +1042,7 @@
           <a:p>
             <a:fld id="{2E700DB3-DBF0-4086-B675-117E7A9610B8}" type="datetimeFigureOut">
               <a:rPr lang="pt-BR" smtClean="0"/>
-              <a:t>11/05/2021</a:t>
+              <a:t>26/08/2021</a:t>
             </a:fld>
             <a:endParaRPr lang="pt-BR"/>
           </a:p>
@@ -1321,7 +1322,7 @@
           <a:p>
             <a:fld id="{2E700DB3-DBF0-4086-B675-117E7A9610B8}" type="datetimeFigureOut">
               <a:rPr lang="pt-BR" smtClean="0"/>
-              <a:t>11/05/2021</a:t>
+              <a:t>26/08/2021</a:t>
             </a:fld>
             <a:endParaRPr lang="pt-BR"/>
           </a:p>
@@ -1735,7 +1736,7 @@
           <a:p>
             <a:fld id="{2E700DB3-DBF0-4086-B675-117E7A9610B8}" type="datetimeFigureOut">
               <a:rPr lang="pt-BR" smtClean="0"/>
-              <a:t>11/05/2021</a:t>
+              <a:t>26/08/2021</a:t>
             </a:fld>
             <a:endParaRPr lang="pt-BR"/>
           </a:p>
@@ -1847,7 +1848,7 @@
           <a:p>
             <a:fld id="{2E700DB3-DBF0-4086-B675-117E7A9610B8}" type="datetimeFigureOut">
               <a:rPr lang="pt-BR" smtClean="0"/>
-              <a:t>11/05/2021</a:t>
+              <a:t>26/08/2021</a:t>
             </a:fld>
             <a:endParaRPr lang="pt-BR"/>
           </a:p>
@@ -1937,7 +1938,7 @@
           <a:p>
             <a:fld id="{2E700DB3-DBF0-4086-B675-117E7A9610B8}" type="datetimeFigureOut">
               <a:rPr lang="pt-BR" smtClean="0"/>
-              <a:t>11/05/2021</a:t>
+              <a:t>26/08/2021</a:t>
             </a:fld>
             <a:endParaRPr lang="pt-BR"/>
           </a:p>
@@ -2207,7 +2208,7 @@
           <a:p>
             <a:fld id="{2E700DB3-DBF0-4086-B675-117E7A9610B8}" type="datetimeFigureOut">
               <a:rPr lang="pt-BR" smtClean="0"/>
-              <a:t>11/05/2021</a:t>
+              <a:t>26/08/2021</a:t>
             </a:fld>
             <a:endParaRPr lang="pt-BR"/>
           </a:p>
@@ -2454,7 +2455,7 @@
           <a:p>
             <a:fld id="{2E700DB3-DBF0-4086-B675-117E7A9610B8}" type="datetimeFigureOut">
               <a:rPr lang="pt-BR" smtClean="0"/>
-              <a:t>11/05/2021</a:t>
+              <a:t>26/08/2021</a:t>
             </a:fld>
             <a:endParaRPr lang="pt-BR"/>
           </a:p>
@@ -2660,7 +2661,7 @@
           <a:p>
             <a:fld id="{2E700DB3-DBF0-4086-B675-117E7A9610B8}" type="datetimeFigureOut">
               <a:rPr lang="pt-BR" smtClean="0"/>
-              <a:t>11/05/2021</a:t>
+              <a:t>26/08/2021</a:t>
             </a:fld>
             <a:endParaRPr lang="pt-BR"/>
           </a:p>
@@ -3144,6 +3145,270 @@
 </p:sld>
 </file>
 
+<file path=ppt/slides/slide2.xml><?xml version="1.0" encoding="utf-8"?>
+<p:sld xmlns:a="http://schemas.openxmlformats.org/drawingml/2006/main" xmlns:r="http://schemas.openxmlformats.org/officeDocument/2006/relationships" xmlns:p="http://schemas.openxmlformats.org/presentationml/2006/main">
+  <p:cSld>
+    <p:spTree>
+      <p:nvGrpSpPr>
+        <p:cNvPr id="1" name=""/>
+        <p:cNvGrpSpPr/>
+        <p:nvPr/>
+      </p:nvGrpSpPr>
+      <p:grpSpPr>
+        <a:xfrm>
+          <a:off x="0" y="0"/>
+          <a:ext cx="0" cy="0"/>
+          <a:chOff x="0" y="0"/>
+          <a:chExt cx="0" cy="0"/>
+        </a:xfrm>
+      </p:grpSpPr>
+      <p:grpSp>
+        <p:nvGrpSpPr>
+          <p:cNvPr id="3" name="Agrupar 2">
+            <a:extLst>
+              <a:ext uri="{FF2B5EF4-FFF2-40B4-BE49-F238E27FC236}">
+                <a16:creationId xmlns:a16="http://schemas.microsoft.com/office/drawing/2014/main" id="{13FD6138-F5D1-4193-9352-674D566364FD}"/>
+              </a:ext>
+            </a:extLst>
+          </p:cNvPr>
+          <p:cNvGrpSpPr/>
+          <p:nvPr/>
+        </p:nvGrpSpPr>
+        <p:grpSpPr>
+          <a:xfrm>
+            <a:off x="2360152" y="0"/>
+            <a:ext cx="4300080" cy="6381328"/>
+            <a:chOff x="2360152" y="0"/>
+            <a:chExt cx="4300080" cy="6381328"/>
+          </a:xfrm>
+        </p:grpSpPr>
+        <p:sp>
+          <p:nvSpPr>
+            <p:cNvPr id="2" name="Retângulo 1">
+              <a:extLst>
+                <a:ext uri="{FF2B5EF4-FFF2-40B4-BE49-F238E27FC236}">
+                  <a16:creationId xmlns:a16="http://schemas.microsoft.com/office/drawing/2014/main" id="{297DF7B3-DDDD-42D4-A013-DF48F37163A8}"/>
+                </a:ext>
+              </a:extLst>
+            </p:cNvPr>
+            <p:cNvSpPr/>
+            <p:nvPr/>
+          </p:nvSpPr>
+          <p:spPr>
+            <a:xfrm>
+              <a:off x="2360152" y="0"/>
+              <a:ext cx="4300080" cy="6381328"/>
+            </a:xfrm>
+            <a:prstGeom prst="rect">
+              <a:avLst/>
+            </a:prstGeom>
+            <a:solidFill>
+              <a:schemeClr val="bg1"/>
+            </a:solidFill>
+            <a:ln>
+              <a:noFill/>
+            </a:ln>
+          </p:spPr>
+          <p:style>
+            <a:lnRef idx="2">
+              <a:schemeClr val="accent1">
+                <a:shade val="50000"/>
+              </a:schemeClr>
+            </a:lnRef>
+            <a:fillRef idx="1">
+              <a:schemeClr val="accent1"/>
+            </a:fillRef>
+            <a:effectRef idx="0">
+              <a:schemeClr val="accent1"/>
+            </a:effectRef>
+            <a:fontRef idx="minor">
+              <a:schemeClr val="lt1"/>
+            </a:fontRef>
+          </p:style>
+          <p:txBody>
+            <a:bodyPr rtlCol="0" anchor="ctr"/>
+            <a:lstStyle/>
+            <a:p>
+              <a:pPr algn="ctr"/>
+              <a:endParaRPr lang="pt-BR"/>
+            </a:p>
+          </p:txBody>
+        </p:sp>
+        <p:grpSp>
+          <p:nvGrpSpPr>
+            <p:cNvPr id="12" name="Agrupar 11">
+              <a:extLst>
+                <a:ext uri="{FF2B5EF4-FFF2-40B4-BE49-F238E27FC236}">
+                  <a16:creationId xmlns:a16="http://schemas.microsoft.com/office/drawing/2014/main" id="{189C8240-1D1E-48D2-A221-1DF9DE1077C9}"/>
+                </a:ext>
+              </a:extLst>
+            </p:cNvPr>
+            <p:cNvGrpSpPr/>
+            <p:nvPr/>
+          </p:nvGrpSpPr>
+          <p:grpSpPr>
+            <a:xfrm>
+              <a:off x="2411760" y="0"/>
+              <a:ext cx="4113472" cy="6381328"/>
+              <a:chOff x="3818579" y="5663"/>
+              <a:chExt cx="4689536" cy="6974059"/>
+            </a:xfrm>
+          </p:grpSpPr>
+          <p:pic>
+            <p:nvPicPr>
+              <p:cNvPr id="7" name="Imagem 6" descr="Uma imagem contendo Interface gráfica do usuário&#10;&#10;Descrição gerada automaticamente">
+                <a:extLst>
+                  <a:ext uri="{FF2B5EF4-FFF2-40B4-BE49-F238E27FC236}">
+                    <a16:creationId xmlns:a16="http://schemas.microsoft.com/office/drawing/2014/main" id="{B90248BC-FFE3-4C52-A136-7A7D7FA49EA8}"/>
+                  </a:ext>
+                </a:extLst>
+              </p:cNvPr>
+              <p:cNvPicPr>
+                <a:picLocks noChangeAspect="1"/>
+              </p:cNvPicPr>
+              <p:nvPr/>
+            </p:nvPicPr>
+            <p:blipFill rotWithShape="1">
+              <a:blip r:embed="rId2" cstate="print">
+                <a:extLst>
+                  <a:ext uri="{28A0092B-C50C-407E-A947-70E740481C1C}">
+                    <a14:useLocalDpi xmlns:a14="http://schemas.microsoft.com/office/drawing/2010/main" val="0"/>
+                  </a:ext>
+                </a:extLst>
+              </a:blip>
+              <a:srcRect t="1699"/>
+              <a:stretch/>
+            </p:blipFill>
+            <p:spPr>
+              <a:xfrm>
+                <a:off x="3852115" y="3547047"/>
+                <a:ext cx="4656000" cy="3432675"/>
+              </a:xfrm>
+              <a:prstGeom prst="rect">
+                <a:avLst/>
+              </a:prstGeom>
+            </p:spPr>
+          </p:pic>
+          <p:pic>
+            <p:nvPicPr>
+              <p:cNvPr id="5" name="Imagem 4" descr="Uma imagem contendo Interface gráfica do usuário&#10;&#10;Descrição gerada automaticamente">
+                <a:extLst>
+                  <a:ext uri="{FF2B5EF4-FFF2-40B4-BE49-F238E27FC236}">
+                    <a16:creationId xmlns:a16="http://schemas.microsoft.com/office/drawing/2014/main" id="{557D27EE-190E-40FE-9091-3FDAD2176A2D}"/>
+                  </a:ext>
+                </a:extLst>
+              </p:cNvPr>
+              <p:cNvPicPr>
+                <a:picLocks noChangeAspect="1"/>
+              </p:cNvPicPr>
+              <p:nvPr/>
+            </p:nvPicPr>
+            <p:blipFill rotWithShape="1">
+              <a:blip r:embed="rId3" cstate="print">
+                <a:extLst>
+                  <a:ext uri="{28A0092B-C50C-407E-A947-70E740481C1C}">
+                    <a14:useLocalDpi xmlns:a14="http://schemas.microsoft.com/office/drawing/2010/main" val="0"/>
+                  </a:ext>
+                </a:extLst>
+              </a:blip>
+              <a:srcRect t="-748" b="2715"/>
+              <a:stretch/>
+            </p:blipFill>
+            <p:spPr>
+              <a:xfrm>
+                <a:off x="3852115" y="5663"/>
+                <a:ext cx="4656000" cy="3423337"/>
+              </a:xfrm>
+              <a:prstGeom prst="rect">
+                <a:avLst/>
+              </a:prstGeom>
+            </p:spPr>
+          </p:pic>
+          <p:pic>
+            <p:nvPicPr>
+              <p:cNvPr id="9" name="Imagem 8" descr="Gráfico&#10;&#10;Descrição gerada automaticamente">
+                <a:extLst>
+                  <a:ext uri="{FF2B5EF4-FFF2-40B4-BE49-F238E27FC236}">
+                    <a16:creationId xmlns:a16="http://schemas.microsoft.com/office/drawing/2014/main" id="{2A6FF51D-301F-4996-9C73-0DCB456BB4A7}"/>
+                  </a:ext>
+                </a:extLst>
+              </p:cNvPr>
+              <p:cNvPicPr>
+                <a:picLocks noChangeAspect="1"/>
+              </p:cNvPicPr>
+              <p:nvPr/>
+            </p:nvPicPr>
+            <p:blipFill rotWithShape="1">
+              <a:blip r:embed="rId4" cstate="print">
+                <a:extLst>
+                  <a:ext uri="{28A0092B-C50C-407E-A947-70E740481C1C}">
+                    <a14:useLocalDpi xmlns:a14="http://schemas.microsoft.com/office/drawing/2010/main" val="0"/>
+                  </a:ext>
+                </a:extLst>
+              </a:blip>
+              <a:srcRect t="1237" r="95500" b="94563"/>
+              <a:stretch/>
+            </p:blipFill>
+            <p:spPr>
+              <a:xfrm>
+                <a:off x="3818579" y="116632"/>
+                <a:ext cx="216025" cy="288032"/>
+              </a:xfrm>
+              <a:prstGeom prst="rect">
+                <a:avLst/>
+              </a:prstGeom>
+            </p:spPr>
+          </p:pic>
+          <p:pic>
+            <p:nvPicPr>
+              <p:cNvPr id="11" name="Imagem 10" descr="Gráfico&#10;&#10;Descrição gerada automaticamente">
+                <a:extLst>
+                  <a:ext uri="{FF2B5EF4-FFF2-40B4-BE49-F238E27FC236}">
+                    <a16:creationId xmlns:a16="http://schemas.microsoft.com/office/drawing/2014/main" id="{4B8F652B-5E25-4FDD-ACEB-E0DAF0B9176E}"/>
+                  </a:ext>
+                </a:extLst>
+              </p:cNvPr>
+              <p:cNvPicPr>
+                <a:picLocks noChangeAspect="1"/>
+              </p:cNvPicPr>
+              <p:nvPr/>
+            </p:nvPicPr>
+            <p:blipFill rotWithShape="1">
+              <a:blip r:embed="rId5" cstate="print">
+                <a:extLst>
+                  <a:ext uri="{28A0092B-C50C-407E-A947-70E740481C1C}">
+                    <a14:useLocalDpi xmlns:a14="http://schemas.microsoft.com/office/drawing/2010/main" val="0"/>
+                  </a:ext>
+                </a:extLst>
+              </a:blip>
+              <a:srcRect t="51091" r="95500" b="45759"/>
+              <a:stretch/>
+            </p:blipFill>
+            <p:spPr>
+              <a:xfrm>
+                <a:off x="3818579" y="3513824"/>
+                <a:ext cx="216024" cy="216024"/>
+              </a:xfrm>
+              <a:prstGeom prst="rect">
+                <a:avLst/>
+              </a:prstGeom>
+            </p:spPr>
+          </p:pic>
+        </p:grpSp>
+      </p:grpSp>
+    </p:spTree>
+    <p:extLst>
+      <p:ext uri="{BB962C8B-B14F-4D97-AF65-F5344CB8AC3E}">
+        <p14:creationId xmlns:p14="http://schemas.microsoft.com/office/powerpoint/2010/main" val="942336701"/>
+      </p:ext>
+    </p:extLst>
+  </p:cSld>
+  <p:clrMapOvr>
+    <a:masterClrMapping/>
+  </p:clrMapOvr>
+</p:sld>
+</file>
+
 <file path=ppt/theme/theme1.xml><?xml version="1.0" encoding="utf-8"?>
 <a:theme xmlns:a="http://schemas.openxmlformats.org/drawingml/2006/main" name="Tema do Office">
   <a:themeElements>

</xml_diff>

<commit_message>
revisao 2, upward continuation correction
</commit_message>
<xml_diff>
--- a/manuscript/Fig/edit_mag.pptx
+++ b/manuscript/Fig/edit_mag.pptx
@@ -8,6 +8,7 @@
     <p:sldId id="256" r:id="rId2"/>
     <p:sldId id="257" r:id="rId3"/>
     <p:sldId id="258" r:id="rId4"/>
+    <p:sldId id="259" r:id="rId5"/>
   </p:sldIdLst>
   <p:sldSz cx="9144000" cy="6858000" type="screen4x3"/>
   <p:notesSz cx="6858000" cy="9144000"/>
@@ -304,7 +305,7 @@
           <a:p>
             <a:fld id="{2E700DB3-DBF0-4086-B675-117E7A9610B8}" type="datetimeFigureOut">
               <a:rPr lang="pt-BR" smtClean="0"/>
-              <a:t>16/01/2022</a:t>
+              <a:t>20/03/2022</a:t>
             </a:fld>
             <a:endParaRPr lang="pt-BR"/>
           </a:p>
@@ -467,7 +468,7 @@
           <a:p>
             <a:fld id="{2E700DB3-DBF0-4086-B675-117E7A9610B8}" type="datetimeFigureOut">
               <a:rPr lang="pt-BR" smtClean="0"/>
-              <a:t>16/01/2022</a:t>
+              <a:t>20/03/2022</a:t>
             </a:fld>
             <a:endParaRPr lang="pt-BR"/>
           </a:p>
@@ -640,7 +641,7 @@
           <a:p>
             <a:fld id="{2E700DB3-DBF0-4086-B675-117E7A9610B8}" type="datetimeFigureOut">
               <a:rPr lang="pt-BR" smtClean="0"/>
-              <a:t>16/01/2022</a:t>
+              <a:t>20/03/2022</a:t>
             </a:fld>
             <a:endParaRPr lang="pt-BR"/>
           </a:p>
@@ -803,7 +804,7 @@
           <a:p>
             <a:fld id="{2E700DB3-DBF0-4086-B675-117E7A9610B8}" type="datetimeFigureOut">
               <a:rPr lang="pt-BR" smtClean="0"/>
-              <a:t>16/01/2022</a:t>
+              <a:t>20/03/2022</a:t>
             </a:fld>
             <a:endParaRPr lang="pt-BR"/>
           </a:p>
@@ -1043,7 +1044,7 @@
           <a:p>
             <a:fld id="{2E700DB3-DBF0-4086-B675-117E7A9610B8}" type="datetimeFigureOut">
               <a:rPr lang="pt-BR" smtClean="0"/>
-              <a:t>16/01/2022</a:t>
+              <a:t>20/03/2022</a:t>
             </a:fld>
             <a:endParaRPr lang="pt-BR"/>
           </a:p>
@@ -1323,7 +1324,7 @@
           <a:p>
             <a:fld id="{2E700DB3-DBF0-4086-B675-117E7A9610B8}" type="datetimeFigureOut">
               <a:rPr lang="pt-BR" smtClean="0"/>
-              <a:t>16/01/2022</a:t>
+              <a:t>20/03/2022</a:t>
             </a:fld>
             <a:endParaRPr lang="pt-BR"/>
           </a:p>
@@ -1737,7 +1738,7 @@
           <a:p>
             <a:fld id="{2E700DB3-DBF0-4086-B675-117E7A9610B8}" type="datetimeFigureOut">
               <a:rPr lang="pt-BR" smtClean="0"/>
-              <a:t>16/01/2022</a:t>
+              <a:t>20/03/2022</a:t>
             </a:fld>
             <a:endParaRPr lang="pt-BR"/>
           </a:p>
@@ -1849,7 +1850,7 @@
           <a:p>
             <a:fld id="{2E700DB3-DBF0-4086-B675-117E7A9610B8}" type="datetimeFigureOut">
               <a:rPr lang="pt-BR" smtClean="0"/>
-              <a:t>16/01/2022</a:t>
+              <a:t>20/03/2022</a:t>
             </a:fld>
             <a:endParaRPr lang="pt-BR"/>
           </a:p>
@@ -1939,7 +1940,7 @@
           <a:p>
             <a:fld id="{2E700DB3-DBF0-4086-B675-117E7A9610B8}" type="datetimeFigureOut">
               <a:rPr lang="pt-BR" smtClean="0"/>
-              <a:t>16/01/2022</a:t>
+              <a:t>20/03/2022</a:t>
             </a:fld>
             <a:endParaRPr lang="pt-BR"/>
           </a:p>
@@ -2209,7 +2210,7 @@
           <a:p>
             <a:fld id="{2E700DB3-DBF0-4086-B675-117E7A9610B8}" type="datetimeFigureOut">
               <a:rPr lang="pt-BR" smtClean="0"/>
-              <a:t>16/01/2022</a:t>
+              <a:t>20/03/2022</a:t>
             </a:fld>
             <a:endParaRPr lang="pt-BR"/>
           </a:p>
@@ -2456,7 +2457,7 @@
           <a:p>
             <a:fld id="{2E700DB3-DBF0-4086-B675-117E7A9610B8}" type="datetimeFigureOut">
               <a:rPr lang="pt-BR" smtClean="0"/>
-              <a:t>16/01/2022</a:t>
+              <a:t>20/03/2022</a:t>
             </a:fld>
             <a:endParaRPr lang="pt-BR"/>
           </a:p>
@@ -2662,7 +2663,7 @@
           <a:p>
             <a:fld id="{2E700DB3-DBF0-4086-B675-117E7A9610B8}" type="datetimeFigureOut">
               <a:rPr lang="pt-BR" smtClean="0"/>
-              <a:t>16/01/2022</a:t>
+              <a:t>20/03/2022</a:t>
             </a:fld>
             <a:endParaRPr lang="pt-BR"/>
           </a:p>
@@ -3546,6 +3547,142 @@
 </p:sld>
 </file>
 
+<file path=ppt/slides/slide4.xml><?xml version="1.0" encoding="utf-8"?>
+<p:sld xmlns:a="http://schemas.openxmlformats.org/drawingml/2006/main" xmlns:r="http://schemas.openxmlformats.org/officeDocument/2006/relationships" xmlns:p="http://schemas.openxmlformats.org/presentationml/2006/main">
+  <p:cSld>
+    <p:spTree>
+      <p:nvGrpSpPr>
+        <p:cNvPr id="1" name=""/>
+        <p:cNvGrpSpPr/>
+        <p:nvPr/>
+      </p:nvGrpSpPr>
+      <p:grpSpPr>
+        <a:xfrm>
+          <a:off x="0" y="0"/>
+          <a:ext cx="0" cy="0"/>
+          <a:chOff x="0" y="0"/>
+          <a:chExt cx="0" cy="0"/>
+        </a:xfrm>
+      </p:grpSpPr>
+      <p:grpSp>
+        <p:nvGrpSpPr>
+          <p:cNvPr id="4" name="Agrupar 3">
+            <a:extLst>
+              <a:ext uri="{FF2B5EF4-FFF2-40B4-BE49-F238E27FC236}">
+                <a16:creationId xmlns:a16="http://schemas.microsoft.com/office/drawing/2014/main" id="{CA541DC7-56A0-4A81-AC56-235077ADF7BA}"/>
+              </a:ext>
+            </a:extLst>
+          </p:cNvPr>
+          <p:cNvGrpSpPr/>
+          <p:nvPr/>
+        </p:nvGrpSpPr>
+        <p:grpSpPr>
+          <a:xfrm>
+            <a:off x="611560" y="1052736"/>
+            <a:ext cx="7632848" cy="4968552"/>
+            <a:chOff x="611560" y="1052736"/>
+            <a:chExt cx="7632848" cy="4968552"/>
+          </a:xfrm>
+        </p:grpSpPr>
+        <p:pic>
+          <p:nvPicPr>
+            <p:cNvPr id="3" name="Imagem 2" descr="Forma&#10;&#10;Descrição gerada automaticamente">
+              <a:extLst>
+                <a:ext uri="{FF2B5EF4-FFF2-40B4-BE49-F238E27FC236}">
+                  <a16:creationId xmlns:a16="http://schemas.microsoft.com/office/drawing/2014/main" id="{CB7784EC-1C82-4F55-ABB1-2420E0C0EAA4}"/>
+                </a:ext>
+              </a:extLst>
+            </p:cNvPr>
+            <p:cNvPicPr>
+              <a:picLocks noChangeAspect="1"/>
+            </p:cNvPicPr>
+            <p:nvPr/>
+          </p:nvPicPr>
+          <p:blipFill rotWithShape="1">
+            <a:blip r:embed="rId2" cstate="print">
+              <a:extLst>
+                <a:ext uri="{28A0092B-C50C-407E-A947-70E740481C1C}">
+                  <a14:useLocalDpi xmlns:a14="http://schemas.microsoft.com/office/drawing/2010/main" val="0"/>
+                </a:ext>
+              </a:extLst>
+            </a:blip>
+            <a:srcRect l="6688" t="10020" r="9838" b="6385"/>
+            <a:stretch/>
+          </p:blipFill>
+          <p:spPr>
+            <a:xfrm>
+              <a:off x="611560" y="1052736"/>
+              <a:ext cx="7632848" cy="4968552"/>
+            </a:xfrm>
+            <a:prstGeom prst="rect">
+              <a:avLst/>
+            </a:prstGeom>
+          </p:spPr>
+        </p:pic>
+        <p:pic>
+          <p:nvPicPr>
+            <p:cNvPr id="6" name="Picture 3" descr="C:\Users\diego_000\Dropbox\Projeto Doutorado\Fast_Eq_Toeplitz\paper-toeplitz\tex\latex\seg\Fig\projection.png">
+              <a:extLst>
+                <a:ext uri="{FF2B5EF4-FFF2-40B4-BE49-F238E27FC236}">
+                  <a16:creationId xmlns:a16="http://schemas.microsoft.com/office/drawing/2014/main" id="{5F3115BB-CFFF-431D-A6F1-6166063F42ED}"/>
+                </a:ext>
+              </a:extLst>
+            </p:cNvPr>
+            <p:cNvPicPr>
+              <a:picLocks noChangeAspect="1" noChangeArrowheads="1"/>
+            </p:cNvPicPr>
+            <p:nvPr/>
+          </p:nvPicPr>
+          <p:blipFill rotWithShape="1">
+            <a:blip r:embed="rId3" cstate="print">
+              <a:extLst>
+                <a:ext uri="{28A0092B-C50C-407E-A947-70E740481C1C}">
+                  <a14:useLocalDpi xmlns:a14="http://schemas.microsoft.com/office/drawing/2010/main" val="0"/>
+                </a:ext>
+              </a:extLst>
+            </a:blip>
+            <a:srcRect l="12893" t="2592" r="12736"/>
+            <a:stretch/>
+          </p:blipFill>
+          <p:spPr bwMode="auto">
+            <a:xfrm>
+              <a:off x="1187624" y="2420888"/>
+              <a:ext cx="853637" cy="745372"/>
+            </a:xfrm>
+            <a:prstGeom prst="rect">
+              <a:avLst/>
+            </a:prstGeom>
+            <a:noFill/>
+            <a:ln>
+              <a:solidFill>
+                <a:schemeClr val="tx1"/>
+              </a:solidFill>
+            </a:ln>
+            <a:extLst>
+              <a:ext uri="{909E8E84-426E-40DD-AFC4-6F175D3DCCD1}">
+                <a14:hiddenFill xmlns:a14="http://schemas.microsoft.com/office/drawing/2010/main">
+                  <a:solidFill>
+                    <a:srgbClr val="FFFFFF"/>
+                  </a:solidFill>
+                </a14:hiddenFill>
+              </a:ext>
+            </a:extLst>
+          </p:spPr>
+        </p:pic>
+      </p:grpSp>
+    </p:spTree>
+    <p:extLst>
+      <p:ext uri="{BB962C8B-B14F-4D97-AF65-F5344CB8AC3E}">
+        <p14:creationId xmlns:p14="http://schemas.microsoft.com/office/powerpoint/2010/main" val="1259733716"/>
+      </p:ext>
+    </p:extLst>
+  </p:cSld>
+  <p:clrMapOvr>
+    <a:masterClrMapping/>
+  </p:clrMapOvr>
+</p:sld>
+</file>
+
 <file path=ppt/theme/theme1.xml><?xml version="1.0" encoding="utf-8"?>
 <a:theme xmlns:a="http://schemas.openxmlformats.org/drawingml/2006/main" name="Tema do Office">
   <a:themeElements>

</xml_diff>

<commit_message>
correcao figura 8 e 9 label
</commit_message>
<xml_diff>
--- a/manuscript/Fig/edit_mag.pptx
+++ b/manuscript/Fig/edit_mag.pptx
@@ -305,7 +305,7 @@
           <a:p>
             <a:fld id="{2E700DB3-DBF0-4086-B675-117E7A9610B8}" type="datetimeFigureOut">
               <a:rPr lang="pt-BR" smtClean="0"/>
-              <a:t>20/03/2022</a:t>
+              <a:t>22/03/2022</a:t>
             </a:fld>
             <a:endParaRPr lang="pt-BR"/>
           </a:p>
@@ -468,7 +468,7 @@
           <a:p>
             <a:fld id="{2E700DB3-DBF0-4086-B675-117E7A9610B8}" type="datetimeFigureOut">
               <a:rPr lang="pt-BR" smtClean="0"/>
-              <a:t>20/03/2022</a:t>
+              <a:t>22/03/2022</a:t>
             </a:fld>
             <a:endParaRPr lang="pt-BR"/>
           </a:p>
@@ -641,7 +641,7 @@
           <a:p>
             <a:fld id="{2E700DB3-DBF0-4086-B675-117E7A9610B8}" type="datetimeFigureOut">
               <a:rPr lang="pt-BR" smtClean="0"/>
-              <a:t>20/03/2022</a:t>
+              <a:t>22/03/2022</a:t>
             </a:fld>
             <a:endParaRPr lang="pt-BR"/>
           </a:p>
@@ -804,7 +804,7 @@
           <a:p>
             <a:fld id="{2E700DB3-DBF0-4086-B675-117E7A9610B8}" type="datetimeFigureOut">
               <a:rPr lang="pt-BR" smtClean="0"/>
-              <a:t>20/03/2022</a:t>
+              <a:t>22/03/2022</a:t>
             </a:fld>
             <a:endParaRPr lang="pt-BR"/>
           </a:p>
@@ -1044,7 +1044,7 @@
           <a:p>
             <a:fld id="{2E700DB3-DBF0-4086-B675-117E7A9610B8}" type="datetimeFigureOut">
               <a:rPr lang="pt-BR" smtClean="0"/>
-              <a:t>20/03/2022</a:t>
+              <a:t>22/03/2022</a:t>
             </a:fld>
             <a:endParaRPr lang="pt-BR"/>
           </a:p>
@@ -1324,7 +1324,7 @@
           <a:p>
             <a:fld id="{2E700DB3-DBF0-4086-B675-117E7A9610B8}" type="datetimeFigureOut">
               <a:rPr lang="pt-BR" smtClean="0"/>
-              <a:t>20/03/2022</a:t>
+              <a:t>22/03/2022</a:t>
             </a:fld>
             <a:endParaRPr lang="pt-BR"/>
           </a:p>
@@ -1738,7 +1738,7 @@
           <a:p>
             <a:fld id="{2E700DB3-DBF0-4086-B675-117E7A9610B8}" type="datetimeFigureOut">
               <a:rPr lang="pt-BR" smtClean="0"/>
-              <a:t>20/03/2022</a:t>
+              <a:t>22/03/2022</a:t>
             </a:fld>
             <a:endParaRPr lang="pt-BR"/>
           </a:p>
@@ -1850,7 +1850,7 @@
           <a:p>
             <a:fld id="{2E700DB3-DBF0-4086-B675-117E7A9610B8}" type="datetimeFigureOut">
               <a:rPr lang="pt-BR" smtClean="0"/>
-              <a:t>20/03/2022</a:t>
+              <a:t>22/03/2022</a:t>
             </a:fld>
             <a:endParaRPr lang="pt-BR"/>
           </a:p>
@@ -1940,7 +1940,7 @@
           <a:p>
             <a:fld id="{2E700DB3-DBF0-4086-B675-117E7A9610B8}" type="datetimeFigureOut">
               <a:rPr lang="pt-BR" smtClean="0"/>
-              <a:t>20/03/2022</a:t>
+              <a:t>22/03/2022</a:t>
             </a:fld>
             <a:endParaRPr lang="pt-BR"/>
           </a:p>
@@ -2210,7 +2210,7 @@
           <a:p>
             <a:fld id="{2E700DB3-DBF0-4086-B675-117E7A9610B8}" type="datetimeFigureOut">
               <a:rPr lang="pt-BR" smtClean="0"/>
-              <a:t>20/03/2022</a:t>
+              <a:t>22/03/2022</a:t>
             </a:fld>
             <a:endParaRPr lang="pt-BR"/>
           </a:p>
@@ -2457,7 +2457,7 @@
           <a:p>
             <a:fld id="{2E700DB3-DBF0-4086-B675-117E7A9610B8}" type="datetimeFigureOut">
               <a:rPr lang="pt-BR" smtClean="0"/>
-              <a:t>20/03/2022</a:t>
+              <a:t>22/03/2022</a:t>
             </a:fld>
             <a:endParaRPr lang="pt-BR"/>
           </a:p>
@@ -2663,7 +2663,7 @@
           <a:p>
             <a:fld id="{2E700DB3-DBF0-4086-B675-117E7A9610B8}" type="datetimeFigureOut">
               <a:rPr lang="pt-BR" smtClean="0"/>
-              <a:t>20/03/2022</a:t>
+              <a:t>22/03/2022</a:t>
             </a:fld>
             <a:endParaRPr lang="pt-BR"/>
           </a:p>
@@ -3566,10 +3566,10 @@
       </p:grpSpPr>
       <p:grpSp>
         <p:nvGrpSpPr>
-          <p:cNvPr id="4" name="Agrupar 3">
+          <p:cNvPr id="8" name="Agrupar 7">
             <a:extLst>
               <a:ext uri="{FF2B5EF4-FFF2-40B4-BE49-F238E27FC236}">
-                <a16:creationId xmlns:a16="http://schemas.microsoft.com/office/drawing/2014/main" id="{CA541DC7-56A0-4A81-AC56-235077ADF7BA}"/>
+                <a16:creationId xmlns:a16="http://schemas.microsoft.com/office/drawing/2014/main" id="{16C9716C-5AF6-4628-A3EC-F5F4DCB67DD4}"/>
               </a:ext>
             </a:extLst>
           </p:cNvPr>
@@ -3578,18 +3578,18 @@
         </p:nvGrpSpPr>
         <p:grpSpPr>
           <a:xfrm>
-            <a:off x="611560" y="1052736"/>
-            <a:ext cx="7632848" cy="4968552"/>
-            <a:chOff x="611560" y="1052736"/>
-            <a:chExt cx="7632848" cy="4968552"/>
+            <a:off x="0" y="457200"/>
+            <a:ext cx="9144000" cy="5943600"/>
+            <a:chOff x="0" y="457200"/>
+            <a:chExt cx="9144000" cy="5943600"/>
           </a:xfrm>
         </p:grpSpPr>
         <p:pic>
           <p:nvPicPr>
-            <p:cNvPr id="3" name="Imagem 2" descr="Forma&#10;&#10;Descrição gerada automaticamente">
+            <p:cNvPr id="5" name="Imagem 4" descr="Interface gráfica do usuário, Forma&#10;&#10;Descrição gerada automaticamente">
               <a:extLst>
                 <a:ext uri="{FF2B5EF4-FFF2-40B4-BE49-F238E27FC236}">
-                  <a16:creationId xmlns:a16="http://schemas.microsoft.com/office/drawing/2014/main" id="{CB7784EC-1C82-4F55-ABB1-2420E0C0EAA4}"/>
+                  <a16:creationId xmlns:a16="http://schemas.microsoft.com/office/drawing/2014/main" id="{C7B1C889-767E-4FC5-84F5-0CAC9BF26E5B}"/>
                 </a:ext>
               </a:extLst>
             </p:cNvPr>
@@ -3598,7 +3598,7 @@
             </p:cNvPicPr>
             <p:nvPr/>
           </p:nvPicPr>
-          <p:blipFill rotWithShape="1">
+          <p:blipFill>
             <a:blip r:embed="rId2" cstate="print">
               <a:extLst>
                 <a:ext uri="{28A0092B-C50C-407E-A947-70E740481C1C}">
@@ -3606,13 +3606,14 @@
                 </a:ext>
               </a:extLst>
             </a:blip>
-            <a:srcRect l="6688" t="10020" r="9838" b="6385"/>
-            <a:stretch/>
+            <a:stretch>
+              <a:fillRect/>
+            </a:stretch>
           </p:blipFill>
           <p:spPr>
             <a:xfrm>
-              <a:off x="611560" y="1052736"/>
-              <a:ext cx="7632848" cy="4968552"/>
+              <a:off x="0" y="457200"/>
+              <a:ext cx="9144000" cy="5943600"/>
             </a:xfrm>
             <a:prstGeom prst="rect">
               <a:avLst/>
@@ -3621,10 +3622,10 @@
         </p:pic>
         <p:pic>
           <p:nvPicPr>
-            <p:cNvPr id="6" name="Picture 3" descr="C:\Users\diego_000\Dropbox\Projeto Doutorado\Fast_Eq_Toeplitz\paper-toeplitz\tex\latex\seg\Fig\projection.png">
+            <p:cNvPr id="7" name="Picture 3" descr="C:\Users\diego_000\Dropbox\Projeto Doutorado\Fast_Eq_Toeplitz\paper-toeplitz\tex\latex\seg\Fig\projection.png">
               <a:extLst>
                 <a:ext uri="{FF2B5EF4-FFF2-40B4-BE49-F238E27FC236}">
-                  <a16:creationId xmlns:a16="http://schemas.microsoft.com/office/drawing/2014/main" id="{5F3115BB-CFFF-431D-A6F1-6166063F42ED}"/>
+                  <a16:creationId xmlns:a16="http://schemas.microsoft.com/office/drawing/2014/main" id="{B65D49B7-DA87-4428-8064-3FEA6DB02614}"/>
                 </a:ext>
               </a:extLst>
             </p:cNvPr>

</xml_diff>